<commit_message>
STEP_4: animate pptx arrows
</commit_message>
<xml_diff>
--- a/pptx/Components_and_Redux.pptx
+++ b/pptx/Components_and_Redux.pptx
@@ -105,6 +105,11 @@
       </a:defRPr>
     </a:lvl9pPr>
   </p:defaultTextStyle>
+  <p:extLst>
+    <p:ext uri="{EFAFB233-063F-42B5-8137-9DF3F51BA10A}">
+      <p15:sldGuideLst xmlns:p15="http://schemas.microsoft.com/office/powerpoint/2012/main"/>
+    </p:ext>
+  </p:extLst>
 </p:presentation>
 </file>
 
@@ -4522,6 +4527,177 @@
           </a:p>
         </p:txBody>
       </p:sp>
+      <p:cxnSp>
+        <p:nvCxnSpPr>
+          <p:cNvPr id="30" name="Connecteur en arc 29">
+            <a:extLst>
+              <a:ext uri="{FF2B5EF4-FFF2-40B4-BE49-F238E27FC236}">
+                <a16:creationId xmlns:a16="http://schemas.microsoft.com/office/drawing/2014/main" id="{F580DD08-DA5F-C044-9BE3-27B384A4DDA8}"/>
+              </a:ext>
+            </a:extLst>
+          </p:cNvPr>
+          <p:cNvCxnSpPr>
+            <a:cxnSpLocks/>
+            <a:stCxn id="18" idx="3"/>
+            <a:endCxn id="12" idx="2"/>
+          </p:cNvCxnSpPr>
+          <p:nvPr/>
+        </p:nvCxnSpPr>
+        <p:spPr>
+          <a:xfrm flipV="1">
+            <a:off x="1862191" y="4183283"/>
+            <a:ext cx="577480" cy="1000019"/>
+          </a:xfrm>
+          <a:prstGeom prst="curvedConnector2">
+            <a:avLst/>
+          </a:prstGeom>
+          <a:ln>
+            <a:tailEnd type="triangle"/>
+          </a:ln>
+        </p:spPr>
+        <p:style>
+          <a:lnRef idx="3">
+            <a:schemeClr val="accent2"/>
+          </a:lnRef>
+          <a:fillRef idx="0">
+            <a:schemeClr val="accent2"/>
+          </a:fillRef>
+          <a:effectRef idx="2">
+            <a:schemeClr val="accent2"/>
+          </a:effectRef>
+          <a:fontRef idx="minor">
+            <a:schemeClr val="tx1"/>
+          </a:fontRef>
+        </p:style>
+      </p:cxnSp>
+      <p:cxnSp>
+        <p:nvCxnSpPr>
+          <p:cNvPr id="32" name="Connecteur en arc 31">
+            <a:extLst>
+              <a:ext uri="{FF2B5EF4-FFF2-40B4-BE49-F238E27FC236}">
+                <a16:creationId xmlns:a16="http://schemas.microsoft.com/office/drawing/2014/main" id="{2220E623-3D15-EA46-B8B6-039E71F473E0}"/>
+              </a:ext>
+            </a:extLst>
+          </p:cNvPr>
+          <p:cNvCxnSpPr>
+            <a:cxnSpLocks/>
+            <a:stCxn id="12" idx="3"/>
+            <a:endCxn id="7" idx="2"/>
+          </p:cNvCxnSpPr>
+          <p:nvPr/>
+        </p:nvCxnSpPr>
+        <p:spPr>
+          <a:xfrm flipV="1">
+            <a:off x="3154581" y="2951246"/>
+            <a:ext cx="521000" cy="949498"/>
+          </a:xfrm>
+          <a:prstGeom prst="curvedConnector2">
+            <a:avLst/>
+          </a:prstGeom>
+          <a:ln>
+            <a:tailEnd type="triangle"/>
+          </a:ln>
+        </p:spPr>
+        <p:style>
+          <a:lnRef idx="3">
+            <a:schemeClr val="accent2"/>
+          </a:lnRef>
+          <a:fillRef idx="0">
+            <a:schemeClr val="accent2"/>
+          </a:fillRef>
+          <a:effectRef idx="2">
+            <a:schemeClr val="accent2"/>
+          </a:effectRef>
+          <a:fontRef idx="minor">
+            <a:schemeClr val="tx1"/>
+          </a:fontRef>
+        </p:style>
+      </p:cxnSp>
+      <p:cxnSp>
+        <p:nvCxnSpPr>
+          <p:cNvPr id="36" name="Connecteur en arc 35">
+            <a:extLst>
+              <a:ext uri="{FF2B5EF4-FFF2-40B4-BE49-F238E27FC236}">
+                <a16:creationId xmlns:a16="http://schemas.microsoft.com/office/drawing/2014/main" id="{0832E7B9-20B8-A34B-A82F-C328E516F159}"/>
+              </a:ext>
+            </a:extLst>
+          </p:cNvPr>
+          <p:cNvCxnSpPr>
+            <a:cxnSpLocks/>
+            <a:stCxn id="4" idx="3"/>
+            <a:endCxn id="6" idx="0"/>
+          </p:cNvCxnSpPr>
+          <p:nvPr/>
+        </p:nvCxnSpPr>
+        <p:spPr>
+          <a:xfrm>
+            <a:off x="6476142" y="1330499"/>
+            <a:ext cx="2089934" cy="1017995"/>
+          </a:xfrm>
+          <a:prstGeom prst="curvedConnector2">
+            <a:avLst/>
+          </a:prstGeom>
+          <a:ln>
+            <a:tailEnd type="triangle"/>
+          </a:ln>
+        </p:spPr>
+        <p:style>
+          <a:lnRef idx="3">
+            <a:schemeClr val="accent6"/>
+          </a:lnRef>
+          <a:fillRef idx="0">
+            <a:schemeClr val="accent6"/>
+          </a:fillRef>
+          <a:effectRef idx="2">
+            <a:schemeClr val="accent6"/>
+          </a:effectRef>
+          <a:fontRef idx="minor">
+            <a:schemeClr val="tx1"/>
+          </a:fontRef>
+        </p:style>
+      </p:cxnSp>
+      <p:cxnSp>
+        <p:nvCxnSpPr>
+          <p:cNvPr id="38" name="Connecteur en arc 37">
+            <a:extLst>
+              <a:ext uri="{FF2B5EF4-FFF2-40B4-BE49-F238E27FC236}">
+                <a16:creationId xmlns:a16="http://schemas.microsoft.com/office/drawing/2014/main" id="{2CF3729E-37E3-4049-9383-92180CC1530D}"/>
+              </a:ext>
+            </a:extLst>
+          </p:cNvPr>
+          <p:cNvCxnSpPr>
+            <a:cxnSpLocks/>
+            <a:stCxn id="6" idx="1"/>
+          </p:cNvCxnSpPr>
+          <p:nvPr/>
+        </p:nvCxnSpPr>
+        <p:spPr>
+          <a:xfrm rot="10800000" flipV="1">
+            <a:off x="7302844" y="2631034"/>
+            <a:ext cx="548323" cy="983750"/>
+          </a:xfrm>
+          <a:prstGeom prst="curvedConnector2">
+            <a:avLst/>
+          </a:prstGeom>
+          <a:ln>
+            <a:tailEnd type="triangle"/>
+          </a:ln>
+        </p:spPr>
+        <p:style>
+          <a:lnRef idx="3">
+            <a:schemeClr val="accent6"/>
+          </a:lnRef>
+          <a:fillRef idx="0">
+            <a:schemeClr val="accent6"/>
+          </a:fillRef>
+          <a:effectRef idx="2">
+            <a:schemeClr val="accent6"/>
+          </a:effectRef>
+          <a:fontRef idx="minor">
+            <a:schemeClr val="tx1"/>
+          </a:fontRef>
+        </p:style>
+      </p:cxnSp>
     </p:spTree>
     <p:extLst>
       <p:ext uri="{BB962C8B-B14F-4D97-AF65-F5344CB8AC3E}">
@@ -4532,6 +4708,265 @@
   <p:clrMapOvr>
     <a:masterClrMapping/>
   </p:clrMapOvr>
+  <p:timing>
+    <p:tnLst>
+      <p:par>
+        <p:cTn id="1" dur="indefinite" restart="never" nodeType="tmRoot">
+          <p:childTnLst>
+            <p:seq concurrent="1" nextAc="seek">
+              <p:cTn id="2" dur="indefinite" nodeType="mainSeq">
+                <p:childTnLst>
+                  <p:par>
+                    <p:cTn id="3" fill="hold">
+                      <p:stCondLst>
+                        <p:cond delay="indefinite"/>
+                      </p:stCondLst>
+                      <p:childTnLst>
+                        <p:par>
+                          <p:cTn id="4" fill="hold">
+                            <p:stCondLst>
+                              <p:cond delay="0"/>
+                            </p:stCondLst>
+                            <p:childTnLst>
+                              <p:par>
+                                <p:cTn id="5" presetID="22" presetClass="entr" presetSubtype="4" fill="hold" nodeType="clickEffect">
+                                  <p:stCondLst>
+                                    <p:cond delay="0"/>
+                                  </p:stCondLst>
+                                  <p:childTnLst>
+                                    <p:set>
+                                      <p:cBhvr>
+                                        <p:cTn id="6" dur="1" fill="hold">
+                                          <p:stCondLst>
+                                            <p:cond delay="0"/>
+                                          </p:stCondLst>
+                                        </p:cTn>
+                                        <p:tgtEl>
+                                          <p:spTgt spid="30"/>
+                                        </p:tgtEl>
+                                        <p:attrNameLst>
+                                          <p:attrName>style.visibility</p:attrName>
+                                        </p:attrNameLst>
+                                      </p:cBhvr>
+                                      <p:to>
+                                        <p:strVal val="visible"/>
+                                      </p:to>
+                                    </p:set>
+                                    <p:animEffect transition="in" filter="wipe(down)">
+                                      <p:cBhvr>
+                                        <p:cTn id="7" dur="500"/>
+                                        <p:tgtEl>
+                                          <p:spTgt spid="30"/>
+                                        </p:tgtEl>
+                                      </p:cBhvr>
+                                    </p:animEffect>
+                                  </p:childTnLst>
+                                </p:cTn>
+                              </p:par>
+                            </p:childTnLst>
+                          </p:cTn>
+                        </p:par>
+                        <p:par>
+                          <p:cTn id="8" fill="hold">
+                            <p:stCondLst>
+                              <p:cond delay="500"/>
+                            </p:stCondLst>
+                            <p:childTnLst>
+                              <p:par>
+                                <p:cTn id="9" presetID="22" presetClass="entr" presetSubtype="4" fill="hold" nodeType="afterEffect">
+                                  <p:stCondLst>
+                                    <p:cond delay="0"/>
+                                  </p:stCondLst>
+                                  <p:childTnLst>
+                                    <p:set>
+                                      <p:cBhvr>
+                                        <p:cTn id="10" dur="1" fill="hold">
+                                          <p:stCondLst>
+                                            <p:cond delay="0"/>
+                                          </p:stCondLst>
+                                        </p:cTn>
+                                        <p:tgtEl>
+                                          <p:spTgt spid="32"/>
+                                        </p:tgtEl>
+                                        <p:attrNameLst>
+                                          <p:attrName>style.visibility</p:attrName>
+                                        </p:attrNameLst>
+                                      </p:cBhvr>
+                                      <p:to>
+                                        <p:strVal val="visible"/>
+                                      </p:to>
+                                    </p:set>
+                                    <p:animEffect transition="in" filter="wipe(down)">
+                                      <p:cBhvr>
+                                        <p:cTn id="11" dur="500"/>
+                                        <p:tgtEl>
+                                          <p:spTgt spid="32"/>
+                                        </p:tgtEl>
+                                      </p:cBhvr>
+                                    </p:animEffect>
+                                  </p:childTnLst>
+                                </p:cTn>
+                              </p:par>
+                            </p:childTnLst>
+                          </p:cTn>
+                        </p:par>
+                        <p:par>
+                          <p:cTn id="12" fill="hold">
+                            <p:stCondLst>
+                              <p:cond delay="1000"/>
+                            </p:stCondLst>
+                            <p:childTnLst>
+                              <p:par>
+                                <p:cTn id="13" presetID="22" presetClass="entr" presetSubtype="4" fill="hold" nodeType="afterEffect">
+                                  <p:stCondLst>
+                                    <p:cond delay="0"/>
+                                  </p:stCondLst>
+                                  <p:childTnLst>
+                                    <p:set>
+                                      <p:cBhvr>
+                                        <p:cTn id="14" dur="1" fill="hold">
+                                          <p:stCondLst>
+                                            <p:cond delay="0"/>
+                                          </p:stCondLst>
+                                        </p:cTn>
+                                        <p:tgtEl>
+                                          <p:spTgt spid="56"/>
+                                        </p:tgtEl>
+                                        <p:attrNameLst>
+                                          <p:attrName>style.visibility</p:attrName>
+                                        </p:attrNameLst>
+                                      </p:cBhvr>
+                                      <p:to>
+                                        <p:strVal val="visible"/>
+                                      </p:to>
+                                    </p:set>
+                                    <p:animEffect transition="in" filter="wipe(down)">
+                                      <p:cBhvr>
+                                        <p:cTn id="15" dur="500"/>
+                                        <p:tgtEl>
+                                          <p:spTgt spid="56"/>
+                                        </p:tgtEl>
+                                      </p:cBhvr>
+                                    </p:animEffect>
+                                  </p:childTnLst>
+                                </p:cTn>
+                              </p:par>
+                            </p:childTnLst>
+                          </p:cTn>
+                        </p:par>
+                        <p:par>
+                          <p:cTn id="16" fill="hold">
+                            <p:stCondLst>
+                              <p:cond delay="1500"/>
+                            </p:stCondLst>
+                            <p:childTnLst>
+                              <p:par>
+                                <p:cTn id="17" presetID="22" presetClass="entr" presetSubtype="1" fill="hold" nodeType="afterEffect">
+                                  <p:stCondLst>
+                                    <p:cond delay="0"/>
+                                  </p:stCondLst>
+                                  <p:childTnLst>
+                                    <p:set>
+                                      <p:cBhvr>
+                                        <p:cTn id="18" dur="1" fill="hold">
+                                          <p:stCondLst>
+                                            <p:cond delay="0"/>
+                                          </p:stCondLst>
+                                        </p:cTn>
+                                        <p:tgtEl>
+                                          <p:spTgt spid="36"/>
+                                        </p:tgtEl>
+                                        <p:attrNameLst>
+                                          <p:attrName>style.visibility</p:attrName>
+                                        </p:attrNameLst>
+                                      </p:cBhvr>
+                                      <p:to>
+                                        <p:strVal val="visible"/>
+                                      </p:to>
+                                    </p:set>
+                                    <p:animEffect transition="in" filter="wipe(up)">
+                                      <p:cBhvr>
+                                        <p:cTn id="19" dur="500"/>
+                                        <p:tgtEl>
+                                          <p:spTgt spid="36"/>
+                                        </p:tgtEl>
+                                      </p:cBhvr>
+                                    </p:animEffect>
+                                  </p:childTnLst>
+                                </p:cTn>
+                              </p:par>
+                            </p:childTnLst>
+                          </p:cTn>
+                        </p:par>
+                        <p:par>
+                          <p:cTn id="20" fill="hold">
+                            <p:stCondLst>
+                              <p:cond delay="2000"/>
+                            </p:stCondLst>
+                            <p:childTnLst>
+                              <p:par>
+                                <p:cTn id="21" presetID="22" presetClass="entr" presetSubtype="1" fill="hold" nodeType="afterEffect">
+                                  <p:stCondLst>
+                                    <p:cond delay="0"/>
+                                  </p:stCondLst>
+                                  <p:childTnLst>
+                                    <p:set>
+                                      <p:cBhvr>
+                                        <p:cTn id="22" dur="1" fill="hold">
+                                          <p:stCondLst>
+                                            <p:cond delay="0"/>
+                                          </p:stCondLst>
+                                        </p:cTn>
+                                        <p:tgtEl>
+                                          <p:spTgt spid="38"/>
+                                        </p:tgtEl>
+                                        <p:attrNameLst>
+                                          <p:attrName>style.visibility</p:attrName>
+                                        </p:attrNameLst>
+                                      </p:cBhvr>
+                                      <p:to>
+                                        <p:strVal val="visible"/>
+                                      </p:to>
+                                    </p:set>
+                                    <p:animEffect transition="in" filter="wipe(up)">
+                                      <p:cBhvr>
+                                        <p:cTn id="23" dur="500"/>
+                                        <p:tgtEl>
+                                          <p:spTgt spid="38"/>
+                                        </p:tgtEl>
+                                      </p:cBhvr>
+                                    </p:animEffect>
+                                  </p:childTnLst>
+                                </p:cTn>
+                              </p:par>
+                            </p:childTnLst>
+                          </p:cTn>
+                        </p:par>
+                      </p:childTnLst>
+                    </p:cTn>
+                  </p:par>
+                </p:childTnLst>
+              </p:cTn>
+              <p:prevCondLst>
+                <p:cond evt="onPrev" delay="0">
+                  <p:tgtEl>
+                    <p:sldTgt/>
+                  </p:tgtEl>
+                </p:cond>
+              </p:prevCondLst>
+              <p:nextCondLst>
+                <p:cond evt="onNext" delay="0">
+                  <p:tgtEl>
+                    <p:sldTgt/>
+                  </p:tgtEl>
+                </p:cond>
+              </p:nextCondLst>
+            </p:seq>
+          </p:childTnLst>
+        </p:cTn>
+      </p:par>
+    </p:tnLst>
+  </p:timing>
 </p:sld>
 </file>
 
@@ -5700,13 +6135,13 @@
   <p:clrMapOvr>
     <a:masterClrMapping/>
   </p:clrMapOvr>
-  <mc:AlternateContent xmlns:mc="http://schemas.openxmlformats.org/markup-compatibility/2006">
-    <mc:Choice xmlns:p159="http://schemas.microsoft.com/office/powerpoint/2015/09/main" Requires="p159">
+  <mc:AlternateContent xmlns:mc="http://schemas.openxmlformats.org/markup-compatibility/2006" xmlns:p159="http://schemas.microsoft.com/office/powerpoint/2015/09/main">
+    <mc:Choice Requires="p159">
       <p:transition xmlns:p14="http://schemas.microsoft.com/office/powerpoint/2010/main" spd="slow" p14:dur="2000">
         <p159:morph option="byObject"/>
       </p:transition>
     </mc:Choice>
-    <mc:Fallback>
+    <mc:Fallback xmlns="">
       <p:transition spd="slow">
         <p:fade/>
       </p:transition>

</xml_diff>